<commit_message>
Complete initial draft of the End Year Presentation.
</commit_message>
<xml_diff>
--- a/End Year Presentation.pptx
+++ b/End Year Presentation.pptx
@@ -5,10 +5,10 @@
     <p:sldMasterId id="2147483649" r:id="rId1"/>
   </p:sldMasterIdLst>
   <p:notesMasterIdLst>
-    <p:notesMasterId r:id="rId16"/>
+    <p:notesMasterId r:id="rId18"/>
   </p:notesMasterIdLst>
   <p:handoutMasterIdLst>
-    <p:handoutMasterId r:id="rId17"/>
+    <p:handoutMasterId r:id="rId19"/>
   </p:handoutMasterIdLst>
   <p:sldIdLst>
     <p:sldId id="256" r:id="rId2"/>
@@ -22,9 +22,11 @@
     <p:sldId id="269" r:id="rId10"/>
     <p:sldId id="272" r:id="rId11"/>
     <p:sldId id="270" r:id="rId12"/>
-    <p:sldId id="271" r:id="rId13"/>
-    <p:sldId id="273" r:id="rId14"/>
-    <p:sldId id="266" r:id="rId15"/>
+    <p:sldId id="279" r:id="rId13"/>
+    <p:sldId id="271" r:id="rId14"/>
+    <p:sldId id="273" r:id="rId15"/>
+    <p:sldId id="278" r:id="rId16"/>
+    <p:sldId id="266" r:id="rId17"/>
   </p:sldIdLst>
   <p:sldSz cx="9144000" cy="6858000" type="screen4x3"/>
   <p:notesSz cx="6858000" cy="9144000"/>
@@ -286,7 +288,7 @@
             <a:fld id="{8BE266B8-587E-45E9-9831-C24C9CA2E489}" type="datetime4">
               <a:rPr lang="en-AU"/>
               <a:pPr/>
-              <a:t>23 November 2011</a:t>
+              <a:t>24 November 2011</a:t>
             </a:fld>
             <a:endParaRPr lang="en-AU"/>
           </a:p>
@@ -689,7 +691,7 @@
             <a:fld id="{69E0915B-5679-433C-BEEF-268271797547}" type="datetime4">
               <a:rPr lang="en-AU"/>
               <a:pPr/>
-              <a:t>23 November 2011</a:t>
+              <a:t>24 November 2011</a:t>
             </a:fld>
             <a:endParaRPr lang="en-AU"/>
           </a:p>
@@ -991,7 +993,7 @@
             <a:fld id="{23A0488A-41B5-4478-AF9E-BCFFE60AE7E4}" type="datetime4">
               <a:rPr lang="en-AU"/>
               <a:pPr/>
-              <a:t>23 November 2011</a:t>
+              <a:t>24 November 2011</a:t>
             </a:fld>
             <a:endParaRPr lang="en-AU"/>
           </a:p>
@@ -1117,51 +1119,7 @@
                 <a:spcPct val="0"/>
               </a:spcBef>
             </a:pPr>
-            <a:r>
-              <a:rPr lang="en-AU" sz="1200">
-                <a:solidFill>
-                  <a:srgbClr val="000000"/>
-                </a:solidFill>
-                <a:ea typeface="ヒラギノ角ゴ Pro W3" pitchFamily="1" charset="0"/>
-                <a:cs typeface="ヒラギノ角ゴ Pro W3" pitchFamily="1" charset="0"/>
-              </a:rPr>
-              <a:t>This is the Presentation Title page. Type over the existing content to add your title and subtitle.</a:t>
-            </a:r>
-          </a:p>
-          <a:p>
-            <a:pPr eaLnBrk="0" hangingPunct="0">
-              <a:spcBef>
-                <a:spcPct val="0"/>
-              </a:spcBef>
-            </a:pPr>
-            <a:r>
-              <a:rPr lang="en-AU" sz="1200">
-                <a:solidFill>
-                  <a:srgbClr val="000000"/>
-                </a:solidFill>
-                <a:ea typeface="ヒラギノ角ゴ Pro W3" pitchFamily="1" charset="0"/>
-                <a:cs typeface="ヒラギノ角ゴ Pro W3" pitchFamily="1" charset="0"/>
-              </a:rPr>
-              <a:t>This page uses the slide master for the Heading page.</a:t>
-            </a:r>
-          </a:p>
-          <a:p>
-            <a:pPr eaLnBrk="0" hangingPunct="0">
-              <a:spcBef>
-                <a:spcPct val="0"/>
-              </a:spcBef>
-            </a:pPr>
-            <a:r>
-              <a:rPr lang="en-AU" sz="1200">
-                <a:solidFill>
-                  <a:srgbClr val="000000"/>
-                </a:solidFill>
-                <a:ea typeface="ヒラギノ角ゴ Pro W3" pitchFamily="1" charset="0"/>
-                <a:cs typeface="ヒラギノ角ゴ Pro W3" pitchFamily="1" charset="0"/>
-              </a:rPr>
-              <a:t>It is recommended that you always include the date of your presentation in the subtitle.</a:t>
-            </a:r>
-            <a:endParaRPr lang="en-AU" sz="1200">
+            <a:endParaRPr lang="en-AU" sz="1200" dirty="0">
               <a:ea typeface="ヒラギノ角ゴ Pro W3" pitchFamily="1" charset="0"/>
               <a:cs typeface="ヒラギノ角ゴ Pro W3" pitchFamily="1" charset="0"/>
             </a:endParaRPr>
@@ -1237,7 +1195,7 @@
             <a:fld id="{BA25E77E-3A04-4012-9711-3C9CC50065B7}" type="datetime4">
               <a:rPr lang="en-AU"/>
               <a:pPr/>
-              <a:t>23 November 2011</a:t>
+              <a:t>24 November 2011</a:t>
             </a:fld>
             <a:endParaRPr lang="en-AU"/>
           </a:p>
@@ -1359,58 +1317,11 @@
           <a:lstStyle/>
           <a:p>
             <a:pPr marL="228600" indent="-228600"/>
-            <a:r>
-              <a:rPr lang="en-AU">
-                <a:solidFill>
-                  <a:srgbClr val="000000"/>
-                </a:solidFill>
-              </a:rPr>
-              <a:t>This slide uses the Title and text slide layout. </a:t>
-            </a:r>
-          </a:p>
-          <a:p>
-            <a:pPr marL="228600" indent="-228600"/>
-            <a:r>
-              <a:rPr lang="en-AU">
-                <a:solidFill>
-                  <a:srgbClr val="000000"/>
-                </a:solidFill>
-              </a:rPr>
-              <a:t>Add a title by clicking on the title box</a:t>
-            </a:r>
-          </a:p>
-          <a:p>
-            <a:pPr marL="228600" indent="-228600"/>
-            <a:r>
-              <a:rPr lang="en-AU">
-                <a:solidFill>
-                  <a:srgbClr val="000000"/>
-                </a:solidFill>
-              </a:rPr>
-              <a:t>Add information into the bulleted list area by typing the text, and pressing RETURN to create new bullets. The look of the bullets and the text is defined by the design template. </a:t>
-            </a:r>
-          </a:p>
-          <a:p>
-            <a:pPr marL="228600" indent="-228600"/>
-            <a:r>
-              <a:rPr lang="en-AU">
-                <a:solidFill>
-                  <a:srgbClr val="000000"/>
-                </a:solidFill>
-              </a:rPr>
-              <a:t>To indent your bullet points press the &lt;tab&gt; key.</a:t>
-            </a:r>
-          </a:p>
-          <a:p>
-            <a:pPr marL="228600" indent="-228600"/>
-            <a:r>
-              <a:rPr lang="en-AU">
-                <a:solidFill>
-                  <a:srgbClr val="000000"/>
-                </a:solidFill>
-              </a:rPr>
-              <a:t>To change the footer information Select View / Header and Footer and change the “Example presentation title” information.</a:t>
-            </a:r>
+            <a:endParaRPr lang="en-AU" dirty="0">
+              <a:solidFill>
+                <a:srgbClr val="000000"/>
+              </a:solidFill>
+            </a:endParaRPr>
           </a:p>
         </p:txBody>
       </p:sp>
@@ -1483,7 +1394,7 @@
             <a:fld id="{BA25E77E-3A04-4012-9711-3C9CC50065B7}" type="datetime4">
               <a:rPr lang="en-AU"/>
               <a:pPr/>
-              <a:t>23 November 2011</a:t>
+              <a:t>24 November 2011</a:t>
             </a:fld>
             <a:endParaRPr lang="en-AU"/>
           </a:p>
@@ -1605,58 +1516,11 @@
           <a:lstStyle/>
           <a:p>
             <a:pPr marL="228600" indent="-228600"/>
-            <a:r>
-              <a:rPr lang="en-AU">
-                <a:solidFill>
-                  <a:srgbClr val="000000"/>
-                </a:solidFill>
-              </a:rPr>
-              <a:t>This slide uses the Title and text slide layout. </a:t>
-            </a:r>
-          </a:p>
-          <a:p>
-            <a:pPr marL="228600" indent="-228600"/>
-            <a:r>
-              <a:rPr lang="en-AU">
-                <a:solidFill>
-                  <a:srgbClr val="000000"/>
-                </a:solidFill>
-              </a:rPr>
-              <a:t>Add a title by clicking on the title box</a:t>
-            </a:r>
-          </a:p>
-          <a:p>
-            <a:pPr marL="228600" indent="-228600"/>
-            <a:r>
-              <a:rPr lang="en-AU">
-                <a:solidFill>
-                  <a:srgbClr val="000000"/>
-                </a:solidFill>
-              </a:rPr>
-              <a:t>Add information into the bulleted list area by typing the text, and pressing RETURN to create new bullets. The look of the bullets and the text is defined by the design template. </a:t>
-            </a:r>
-          </a:p>
-          <a:p>
-            <a:pPr marL="228600" indent="-228600"/>
-            <a:r>
-              <a:rPr lang="en-AU">
-                <a:solidFill>
-                  <a:srgbClr val="000000"/>
-                </a:solidFill>
-              </a:rPr>
-              <a:t>To indent your bullet points press the &lt;tab&gt; key.</a:t>
-            </a:r>
-          </a:p>
-          <a:p>
-            <a:pPr marL="228600" indent="-228600"/>
-            <a:r>
-              <a:rPr lang="en-AU">
-                <a:solidFill>
-                  <a:srgbClr val="000000"/>
-                </a:solidFill>
-              </a:rPr>
-              <a:t>To change the footer information Select View / Header and Footer and change the “Example presentation title” information.</a:t>
-            </a:r>
+            <a:endParaRPr lang="en-AU" dirty="0">
+              <a:solidFill>
+                <a:srgbClr val="000000"/>
+              </a:solidFill>
+            </a:endParaRPr>
           </a:p>
         </p:txBody>
       </p:sp>
@@ -1729,7 +1593,7 @@
             <a:fld id="{BA25E77E-3A04-4012-9711-3C9CC50065B7}" type="datetime4">
               <a:rPr lang="en-AU"/>
               <a:pPr/>
-              <a:t>23 November 2011</a:t>
+              <a:t>24 November 2011</a:t>
             </a:fld>
             <a:endParaRPr lang="en-AU"/>
           </a:p>
@@ -1851,58 +1715,11 @@
           <a:lstStyle/>
           <a:p>
             <a:pPr marL="228600" indent="-228600"/>
-            <a:r>
-              <a:rPr lang="en-AU">
-                <a:solidFill>
-                  <a:srgbClr val="000000"/>
-                </a:solidFill>
-              </a:rPr>
-              <a:t>This slide uses the Title and text slide layout. </a:t>
-            </a:r>
-          </a:p>
-          <a:p>
-            <a:pPr marL="228600" indent="-228600"/>
-            <a:r>
-              <a:rPr lang="en-AU">
-                <a:solidFill>
-                  <a:srgbClr val="000000"/>
-                </a:solidFill>
-              </a:rPr>
-              <a:t>Add a title by clicking on the title box</a:t>
-            </a:r>
-          </a:p>
-          <a:p>
-            <a:pPr marL="228600" indent="-228600"/>
-            <a:r>
-              <a:rPr lang="en-AU">
-                <a:solidFill>
-                  <a:srgbClr val="000000"/>
-                </a:solidFill>
-              </a:rPr>
-              <a:t>Add information into the bulleted list area by typing the text, and pressing RETURN to create new bullets. The look of the bullets and the text is defined by the design template. </a:t>
-            </a:r>
-          </a:p>
-          <a:p>
-            <a:pPr marL="228600" indent="-228600"/>
-            <a:r>
-              <a:rPr lang="en-AU">
-                <a:solidFill>
-                  <a:srgbClr val="000000"/>
-                </a:solidFill>
-              </a:rPr>
-              <a:t>To indent your bullet points press the &lt;tab&gt; key.</a:t>
-            </a:r>
-          </a:p>
-          <a:p>
-            <a:pPr marL="228600" indent="-228600"/>
-            <a:r>
-              <a:rPr lang="en-AU">
-                <a:solidFill>
-                  <a:srgbClr val="000000"/>
-                </a:solidFill>
-              </a:rPr>
-              <a:t>To change the footer information Select View / Header and Footer and change the “Example presentation title” information.</a:t>
-            </a:r>
+            <a:endParaRPr lang="en-AU" dirty="0">
+              <a:solidFill>
+                <a:srgbClr val="000000"/>
+              </a:solidFill>
+            </a:endParaRPr>
           </a:p>
         </p:txBody>
       </p:sp>
@@ -1933,6 +1750,158 @@
       </p:grpSpPr>
       <p:sp>
         <p:nvSpPr>
+          <p:cNvPr id="2" name="Slide Image Placeholder 1"/>
+          <p:cNvSpPr>
+            <a:spLocks noGrp="1" noRot="1" noChangeAspect="1"/>
+          </p:cNvSpPr>
+          <p:nvPr>
+            <p:ph type="sldImg"/>
+          </p:nvPr>
+        </p:nvSpPr>
+        <p:spPr/>
+      </p:sp>
+      <p:sp>
+        <p:nvSpPr>
+          <p:cNvPr id="3" name="Notes Placeholder 2"/>
+          <p:cNvSpPr>
+            <a:spLocks noGrp="1"/>
+          </p:cNvSpPr>
+          <p:nvPr>
+            <p:ph type="body" idx="1"/>
+          </p:nvPr>
+        </p:nvSpPr>
+        <p:spPr/>
+        <p:txBody>
+          <a:bodyPr>
+            <a:normAutofit/>
+          </a:bodyPr>
+          <a:lstStyle/>
+          <a:p>
+            <a:endParaRPr lang="en-AU" dirty="0"/>
+          </a:p>
+        </p:txBody>
+      </p:sp>
+      <p:sp>
+        <p:nvSpPr>
+          <p:cNvPr id="4" name="Header Placeholder 3"/>
+          <p:cNvSpPr>
+            <a:spLocks noGrp="1"/>
+          </p:cNvSpPr>
+          <p:nvPr>
+            <p:ph type="hdr" sz="quarter" idx="10"/>
+          </p:nvPr>
+        </p:nvSpPr>
+        <p:spPr/>
+        <p:txBody>
+          <a:bodyPr/>
+          <a:lstStyle/>
+          <a:p>
+            <a:r>
+              <a:rPr lang="en-AU" smtClean="0"/>
+              <a:t>Example title for notes and handouts</a:t>
+            </a:r>
+            <a:endParaRPr lang="en-AU"/>
+          </a:p>
+        </p:txBody>
+      </p:sp>
+      <p:sp>
+        <p:nvSpPr>
+          <p:cNvPr id="5" name="Date Placeholder 4"/>
+          <p:cNvSpPr>
+            <a:spLocks noGrp="1"/>
+          </p:cNvSpPr>
+          <p:nvPr>
+            <p:ph type="dt" idx="11"/>
+          </p:nvPr>
+        </p:nvSpPr>
+        <p:spPr/>
+        <p:txBody>
+          <a:bodyPr/>
+          <a:lstStyle/>
+          <a:p>
+            <a:fld id="{69E0915B-5679-433C-BEEF-268271797547}" type="datetime4">
+              <a:rPr lang="en-AU" smtClean="0"/>
+              <a:pPr/>
+              <a:t>24 November 2011</a:t>
+            </a:fld>
+            <a:endParaRPr lang="en-AU"/>
+          </a:p>
+        </p:txBody>
+      </p:sp>
+      <p:sp>
+        <p:nvSpPr>
+          <p:cNvPr id="6" name="Footer Placeholder 5"/>
+          <p:cNvSpPr>
+            <a:spLocks noGrp="1"/>
+          </p:cNvSpPr>
+          <p:nvPr>
+            <p:ph type="ftr" sz="quarter" idx="12"/>
+          </p:nvPr>
+        </p:nvSpPr>
+        <p:spPr/>
+        <p:txBody>
+          <a:bodyPr/>
+          <a:lstStyle/>
+          <a:p>
+            <a:r>
+              <a:rPr lang="en-AU" smtClean="0"/>
+              <a:t>Example footer for notes and handouts</a:t>
+            </a:r>
+            <a:endParaRPr lang="en-AU"/>
+          </a:p>
+        </p:txBody>
+      </p:sp>
+      <p:sp>
+        <p:nvSpPr>
+          <p:cNvPr id="7" name="Slide Number Placeholder 6"/>
+          <p:cNvSpPr>
+            <a:spLocks noGrp="1"/>
+          </p:cNvSpPr>
+          <p:nvPr>
+            <p:ph type="sldNum" sz="quarter" idx="13"/>
+          </p:nvPr>
+        </p:nvSpPr>
+        <p:spPr/>
+        <p:txBody>
+          <a:bodyPr/>
+          <a:lstStyle/>
+          <a:p>
+            <a:fld id="{1C9B0F9D-6DDA-4243-9B8F-E7800F67948B}" type="slidenum">
+              <a:rPr lang="en-AU" smtClean="0"/>
+              <a:pPr/>
+              <a:t>15</a:t>
+            </a:fld>
+            <a:endParaRPr lang="en-AU"/>
+          </a:p>
+        </p:txBody>
+      </p:sp>
+    </p:spTree>
+  </p:cSld>
+  <p:clrMapOvr>
+    <a:masterClrMapping/>
+  </p:clrMapOvr>
+</p:notes>
+</file>
+
+<file path=ppt/notesSlides/notesSlide6.xml><?xml version="1.0" encoding="utf-8"?>
+<p:notes xmlns:a="http://schemas.openxmlformats.org/drawingml/2006/main" xmlns:r="http://schemas.openxmlformats.org/officeDocument/2006/relationships" xmlns:p="http://schemas.openxmlformats.org/presentationml/2006/main">
+  <p:cSld>
+    <p:spTree>
+      <p:nvGrpSpPr>
+        <p:cNvPr id="1" name=""/>
+        <p:cNvGrpSpPr/>
+        <p:nvPr/>
+      </p:nvGrpSpPr>
+      <p:grpSpPr>
+        <a:xfrm>
+          <a:off x="0" y="0"/>
+          <a:ext cx="0" cy="0"/>
+          <a:chOff x="0" y="0"/>
+          <a:chExt cx="0" cy="0"/>
+        </a:xfrm>
+      </p:grpSpPr>
+      <p:sp>
+        <p:nvSpPr>
           <p:cNvPr id="4" name="Rectangle 15"/>
           <p:cNvSpPr>
             <a:spLocks noGrp="1" noChangeArrowheads="1"/>
@@ -1975,7 +1944,7 @@
             <a:fld id="{FE43F505-3EA0-4E95-B7C8-9CE4A21DD553}" type="datetime4">
               <a:rPr lang="en-AU"/>
               <a:pPr/>
-              <a:t>23 November 2011</a:t>
+              <a:t>24 November 2011</a:t>
             </a:fld>
             <a:endParaRPr lang="en-AU"/>
           </a:p>
@@ -2025,7 +1994,7 @@
             <a:fld id="{72763F2E-AA00-419F-9046-B5570899AD0C}" type="slidenum">
               <a:rPr lang="en-AU"/>
               <a:pPr/>
-              <a:t>14</a:t>
+              <a:t>16</a:t>
             </a:fld>
             <a:endParaRPr lang="en-AU"/>
           </a:p>
@@ -4964,8 +4933,13 @@
             </a:br>
             <a:r>
               <a:rPr lang="en-AU" sz="2000" b="1" baseline="0" dirty="0" smtClean="0"/>
-              <a:t>Dean Camera</a:t>
-            </a:r>
+              <a:t>Dean </a:t>
+            </a:r>
+            <a:r>
+              <a:rPr lang="en-AU" sz="2000" b="1" baseline="0" dirty="0" smtClean="0"/>
+              <a:t>Camera</a:t>
+            </a:r>
+            <a:endParaRPr lang="en-AU" sz="2000" b="1" baseline="0" dirty="0" smtClean="0"/>
           </a:p>
           <a:p>
             <a:endParaRPr lang="en-AU" sz="2000" b="1" baseline="0" dirty="0" smtClean="0"/>
@@ -5227,11 +5201,7 @@
           <a:p>
             <a:r>
               <a:rPr lang="en-AU" dirty="0" smtClean="0"/>
-              <a:t>Embedded Bluetooth Stack </a:t>
-            </a:r>
-            <a:r>
-              <a:rPr lang="en-AU" dirty="0" smtClean="0"/>
-              <a:t>	Page </a:t>
+              <a:t>Embedded Bluetooth Stack 	Page </a:t>
             </a:r>
             <a:fld id="{16BD8E54-B886-4508-8B88-F1738B0A148F}" type="slidenum">
               <a:rPr lang="en-AU" smtClean="0"/>
@@ -5248,6 +5218,13 @@
     <a:masterClrMapping/>
   </p:clrMapOvr>
   <p:transition/>
+  <p:timing>
+    <p:tnLst>
+      <p:par>
+        <p:cTn id="1" dur="indefinite" restart="never" nodeType="tmRoot"/>
+      </p:par>
+    </p:tnLst>
+  </p:timing>
 </p:sld>
 </file>
 
@@ -5308,11 +5285,7 @@
           <a:p>
             <a:r>
               <a:rPr lang="en-AU" dirty="0" smtClean="0"/>
-              <a:t>Embedded Bluetooth Stack </a:t>
-            </a:r>
-            <a:r>
-              <a:rPr lang="en-AU" dirty="0" smtClean="0"/>
-              <a:t>	Page </a:t>
+              <a:t>Embedded Bluetooth Stack 	Page </a:t>
             </a:r>
             <a:fld id="{16BD8E54-B886-4508-8B88-F1738B0A148F}" type="slidenum">
               <a:rPr lang="en-AU" smtClean="0"/>
@@ -5376,6 +5349,13 @@
     <a:masterClrMapping/>
   </p:clrMapOvr>
   <p:transition/>
+  <p:timing>
+    <p:tnLst>
+      <p:par>
+        <p:cTn id="1" dur="indefinite" restart="never" nodeType="tmRoot"/>
+      </p:par>
+    </p:tnLst>
+  </p:timing>
 </p:sld>
 </file>
 
@@ -5413,6 +5393,114 @@
           <a:p>
             <a:r>
               <a:rPr lang="en-AU" dirty="0" smtClean="0"/>
+              <a:t>Firmware Block Diagram</a:t>
+            </a:r>
+            <a:endParaRPr lang="en-AU" dirty="0"/>
+          </a:p>
+        </p:txBody>
+      </p:sp>
+      <p:sp>
+        <p:nvSpPr>
+          <p:cNvPr id="4" name="Footer Placeholder 3"/>
+          <p:cNvSpPr>
+            <a:spLocks noGrp="1"/>
+          </p:cNvSpPr>
+          <p:nvPr>
+            <p:ph type="ftr" sz="quarter" idx="10"/>
+          </p:nvPr>
+        </p:nvSpPr>
+        <p:spPr/>
+        <p:txBody>
+          <a:bodyPr/>
+          <a:lstStyle/>
+          <a:p>
+            <a:r>
+              <a:rPr lang="en-AU" dirty="0" smtClean="0"/>
+              <a:t>Embedded Bluetooth Stack	Page </a:t>
+            </a:r>
+            <a:fld id="{16BD8E54-B886-4508-8B88-F1738B0A148F}" type="slidenum">
+              <a:rPr lang="en-AU" smtClean="0"/>
+              <a:pPr/>
+              <a:t>12</a:t>
+            </a:fld>
+            <a:endParaRPr lang="en-AU" dirty="0"/>
+          </a:p>
+        </p:txBody>
+      </p:sp>
+      <p:pic>
+        <p:nvPicPr>
+          <p:cNvPr id="5" name="Picture 4" descr="FirmwareBlockDiagram.png"/>
+          <p:cNvPicPr>
+            <a:picLocks noChangeAspect="1"/>
+          </p:cNvPicPr>
+          <p:nvPr/>
+        </p:nvPicPr>
+        <p:blipFill>
+          <a:blip r:embed="rId2" cstate="print"/>
+          <a:stretch>
+            <a:fillRect/>
+          </a:stretch>
+        </p:blipFill>
+        <p:spPr>
+          <a:xfrm>
+            <a:off x="1835696" y="1268760"/>
+            <a:ext cx="5661943" cy="4392487"/>
+          </a:xfrm>
+          <a:prstGeom prst="rect">
+            <a:avLst/>
+          </a:prstGeom>
+        </p:spPr>
+      </p:pic>
+    </p:spTree>
+  </p:cSld>
+  <p:clrMapOvr>
+    <a:masterClrMapping/>
+  </p:clrMapOvr>
+  <p:transition/>
+  <p:timing>
+    <p:tnLst>
+      <p:par>
+        <p:cTn id="1" dur="indefinite" restart="never" nodeType="tmRoot"/>
+      </p:par>
+    </p:tnLst>
+  </p:timing>
+</p:sld>
+</file>
+
+<file path=ppt/slides/slide13.xml><?xml version="1.0" encoding="utf-8"?>
+<p:sld xmlns:a="http://schemas.openxmlformats.org/drawingml/2006/main" xmlns:r="http://schemas.openxmlformats.org/officeDocument/2006/relationships" xmlns:p="http://schemas.openxmlformats.org/presentationml/2006/main">
+  <p:cSld>
+    <p:spTree>
+      <p:nvGrpSpPr>
+        <p:cNvPr id="1" name=""/>
+        <p:cNvGrpSpPr/>
+        <p:nvPr/>
+      </p:nvGrpSpPr>
+      <p:grpSpPr>
+        <a:xfrm>
+          <a:off x="0" y="0"/>
+          <a:ext cx="0" cy="0"/>
+          <a:chOff x="0" y="0"/>
+          <a:chExt cx="0" cy="0"/>
+        </a:xfrm>
+      </p:grpSpPr>
+      <p:sp>
+        <p:nvSpPr>
+          <p:cNvPr id="2" name="Title 1"/>
+          <p:cNvSpPr>
+            <a:spLocks noGrp="1"/>
+          </p:cNvSpPr>
+          <p:nvPr>
+            <p:ph type="title"/>
+          </p:nvPr>
+        </p:nvSpPr>
+        <p:spPr/>
+        <p:txBody>
+          <a:bodyPr/>
+          <a:lstStyle/>
+          <a:p>
+            <a:r>
+              <a:rPr lang="en-AU" dirty="0" smtClean="0"/>
               <a:t>Tested Bluetooth Devices</a:t>
             </a:r>
             <a:endParaRPr lang="en-AU" dirty="0"/>
@@ -5508,16 +5596,12 @@
           <a:p>
             <a:r>
               <a:rPr lang="en-AU" dirty="0" smtClean="0"/>
-              <a:t>Embedded Bluetooth Stack </a:t>
-            </a:r>
-            <a:r>
-              <a:rPr lang="en-AU" dirty="0" smtClean="0"/>
-              <a:t>	Page </a:t>
+              <a:t>Embedded Bluetooth Stack 	Page </a:t>
             </a:r>
             <a:fld id="{16BD8E54-B886-4508-8B88-F1738B0A148F}" type="slidenum">
               <a:rPr lang="en-AU" smtClean="0"/>
               <a:pPr/>
-              <a:t>12</a:t>
+              <a:t>13</a:t>
             </a:fld>
             <a:endParaRPr lang="en-AU" dirty="0"/>
           </a:p>
@@ -5553,10 +5637,17 @@
     <a:masterClrMapping/>
   </p:clrMapOvr>
   <p:transition/>
+  <p:timing>
+    <p:tnLst>
+      <p:par>
+        <p:cTn id="1" dur="indefinite" restart="never" nodeType="tmRoot"/>
+      </p:par>
+    </p:tnLst>
+  </p:timing>
 </p:sld>
 </file>
 
-<file path=ppt/slides/slide13.xml><?xml version="1.0" encoding="utf-8"?>
+<file path=ppt/slides/slide14.xml><?xml version="1.0" encoding="utf-8"?>
 <p:sld xmlns:a="http://schemas.openxmlformats.org/drawingml/2006/main" xmlns:r="http://schemas.openxmlformats.org/officeDocument/2006/relationships" xmlns:p="http://schemas.openxmlformats.org/presentationml/2006/main">
   <p:cSld>
     <p:spTree>
@@ -5632,11 +5723,7 @@
             <a:pPr lvl="1"/>
             <a:r>
               <a:rPr lang="en-AU" dirty="0" smtClean="0"/>
-              <a:t>Graphs sensor data from the robot </a:t>
-            </a:r>
-            <a:r>
-              <a:rPr lang="en-AU" dirty="0" smtClean="0"/>
-              <a:t>in real time </a:t>
+              <a:t>Graphs sensor data from the robot in real time </a:t>
             </a:r>
             <a:endParaRPr lang="en-AU" dirty="0"/>
           </a:p>
@@ -5659,16 +5746,12 @@
           <a:p>
             <a:r>
               <a:rPr lang="en-AU" dirty="0" smtClean="0"/>
-              <a:t>Embedded Bluetooth Stack </a:t>
-            </a:r>
-            <a:r>
-              <a:rPr lang="en-AU" dirty="0" smtClean="0"/>
-              <a:t>	Page </a:t>
+              <a:t>Embedded Bluetooth Stack 	Page </a:t>
             </a:r>
             <a:fld id="{16BD8E54-B886-4508-8B88-F1738B0A148F}" type="slidenum">
               <a:rPr lang="en-AU" smtClean="0"/>
               <a:pPr/>
-              <a:t>13</a:t>
+              <a:t>14</a:t>
             </a:fld>
             <a:endParaRPr lang="en-AU" dirty="0"/>
           </a:p>
@@ -5712,10 +5795,190 @@
     <a:masterClrMapping/>
   </p:clrMapOvr>
   <p:transition/>
+  <p:timing>
+    <p:tnLst>
+      <p:par>
+        <p:cTn id="1" dur="indefinite" restart="never" nodeType="tmRoot"/>
+      </p:par>
+    </p:tnLst>
+  </p:timing>
 </p:sld>
 </file>
 
-<file path=ppt/slides/slide14.xml><?xml version="1.0" encoding="utf-8"?>
+<file path=ppt/slides/slide15.xml><?xml version="1.0" encoding="utf-8"?>
+<p:sld xmlns:a="http://schemas.openxmlformats.org/drawingml/2006/main" xmlns:r="http://schemas.openxmlformats.org/officeDocument/2006/relationships" xmlns:p="http://schemas.openxmlformats.org/presentationml/2006/main">
+  <p:cSld>
+    <p:spTree>
+      <p:nvGrpSpPr>
+        <p:cNvPr id="1" name=""/>
+        <p:cNvGrpSpPr/>
+        <p:nvPr/>
+      </p:nvGrpSpPr>
+      <p:grpSpPr>
+        <a:xfrm>
+          <a:off x="0" y="0"/>
+          <a:ext cx="0" cy="0"/>
+          <a:chOff x="0" y="0"/>
+          <a:chExt cx="0" cy="0"/>
+        </a:xfrm>
+      </p:grpSpPr>
+      <p:sp>
+        <p:nvSpPr>
+          <p:cNvPr id="2" name="Title 1"/>
+          <p:cNvSpPr>
+            <a:spLocks noGrp="1"/>
+          </p:cNvSpPr>
+          <p:nvPr>
+            <p:ph type="title"/>
+          </p:nvPr>
+        </p:nvSpPr>
+        <p:spPr/>
+        <p:txBody>
+          <a:bodyPr/>
+          <a:lstStyle/>
+          <a:p>
+            <a:r>
+              <a:rPr lang="en-AU" dirty="0" smtClean="0"/>
+              <a:t>More Information</a:t>
+            </a:r>
+            <a:endParaRPr lang="en-AU" dirty="0"/>
+          </a:p>
+        </p:txBody>
+      </p:sp>
+      <p:sp>
+        <p:nvSpPr>
+          <p:cNvPr id="3" name="Content Placeholder 2"/>
+          <p:cNvSpPr>
+            <a:spLocks noGrp="1"/>
+          </p:cNvSpPr>
+          <p:nvPr>
+            <p:ph idx="1"/>
+          </p:nvPr>
+        </p:nvSpPr>
+        <p:spPr>
+          <a:xfrm>
+            <a:off x="467544" y="1340768"/>
+            <a:ext cx="8229600" cy="4525963"/>
+          </a:xfrm>
+        </p:spPr>
+        <p:txBody>
+          <a:bodyPr/>
+          <a:lstStyle/>
+          <a:p>
+            <a:r>
+              <a:rPr lang="en-AU" dirty="0" smtClean="0"/>
+              <a:t>All project materials (source code, thesis, presentations, photos) uploaded online</a:t>
+            </a:r>
+            <a:endParaRPr lang="en-AU" dirty="0" smtClean="0"/>
+          </a:p>
+          <a:p>
+            <a:endParaRPr lang="en-AU" sz="1400" dirty="0" smtClean="0"/>
+          </a:p>
+          <a:p>
+            <a:r>
+              <a:rPr lang="en-AU" dirty="0" smtClean="0"/>
+              <a:t>Source code released under a MIT license</a:t>
+            </a:r>
+          </a:p>
+          <a:p>
+            <a:endParaRPr lang="en-AU" sz="1400" dirty="0" smtClean="0"/>
+          </a:p>
+          <a:p>
+            <a:r>
+              <a:rPr lang="en-AU" dirty="0" smtClean="0"/>
+              <a:t>Full SVN revision history available</a:t>
+            </a:r>
+            <a:endParaRPr lang="en-AU" dirty="0"/>
+          </a:p>
+        </p:txBody>
+      </p:sp>
+      <p:sp>
+        <p:nvSpPr>
+          <p:cNvPr id="4" name="Footer Placeholder 3"/>
+          <p:cNvSpPr>
+            <a:spLocks noGrp="1"/>
+          </p:cNvSpPr>
+          <p:nvPr>
+            <p:ph type="ftr" sz="quarter" idx="10"/>
+          </p:nvPr>
+        </p:nvSpPr>
+        <p:spPr/>
+        <p:txBody>
+          <a:bodyPr/>
+          <a:lstStyle/>
+          <a:p>
+            <a:r>
+              <a:rPr lang="en-AU" dirty="0" smtClean="0"/>
+              <a:t>Embedded Bluetooth Stack 	Page </a:t>
+            </a:r>
+            <a:fld id="{16BD8E54-B886-4508-8B88-F1738B0A148F}" type="slidenum">
+              <a:rPr lang="en-AU" smtClean="0"/>
+              <a:pPr/>
+              <a:t>15</a:t>
+            </a:fld>
+            <a:endParaRPr lang="en-AU" dirty="0"/>
+          </a:p>
+        </p:txBody>
+      </p:sp>
+      <p:sp>
+        <p:nvSpPr>
+          <p:cNvPr id="6" name="TextBox 5"/>
+          <p:cNvSpPr txBox="1"/>
+          <p:nvPr/>
+        </p:nvSpPr>
+        <p:spPr>
+          <a:xfrm>
+            <a:off x="1403648" y="4581128"/>
+            <a:ext cx="6247864" cy="356251"/>
+          </a:xfrm>
+          <a:prstGeom prst="rect">
+            <a:avLst/>
+          </a:prstGeom>
+          <a:noFill/>
+        </p:spPr>
+        <p:txBody>
+          <a:bodyPr wrap="none" rtlCol="0">
+            <a:spAutoFit/>
+          </a:bodyPr>
+          <a:lstStyle/>
+          <a:p>
+            <a:r>
+              <a:rPr lang="en-AU" dirty="0" smtClean="0">
+                <a:solidFill>
+                  <a:schemeClr val="accent3">
+                    <a:lumMod val="50000"/>
+                  </a:schemeClr>
+                </a:solidFill>
+              </a:rPr>
+              <a:t>www.fourwalledcubicle.com/ExplorerBot.php</a:t>
+            </a:r>
+            <a:endParaRPr lang="en-AU" dirty="0">
+              <a:solidFill>
+                <a:schemeClr val="accent3">
+                  <a:lumMod val="50000"/>
+                </a:schemeClr>
+              </a:solidFill>
+            </a:endParaRPr>
+          </a:p>
+        </p:txBody>
+      </p:sp>
+    </p:spTree>
+  </p:cSld>
+  <p:clrMapOvr>
+    <a:masterClrMapping/>
+  </p:clrMapOvr>
+  <p:transition/>
+  <p:timing>
+    <p:tnLst>
+      <p:par>
+        <p:cTn id="1" dur="indefinite" restart="never" nodeType="tmRoot"/>
+      </p:par>
+    </p:tnLst>
+  </p:timing>
+</p:sld>
+</file>
+
+<file path=ppt/slides/slide16.xml><?xml version="1.0" encoding="utf-8"?>
 <p:sld xmlns:a="http://schemas.openxmlformats.org/drawingml/2006/main" xmlns:r="http://schemas.openxmlformats.org/officeDocument/2006/relationships" xmlns:p="http://schemas.openxmlformats.org/presentationml/2006/main">
   <p:cSld>
     <p:bg>
@@ -5762,7 +6025,7 @@
             <a:fld id="{5D2622F4-9405-4DE5-B97E-733608A89F07}" type="slidenum">
               <a:rPr lang="en-AU"/>
               <a:pPr/>
-              <a:t>14</a:t>
+              <a:t>16</a:t>
             </a:fld>
             <a:endParaRPr lang="en-AU"/>
           </a:p>
@@ -5894,11 +6157,7 @@
           <a:p>
             <a:r>
               <a:rPr lang="en-AU" dirty="0" smtClean="0"/>
-              <a:t>Embedded Bluetoot</a:t>
-            </a:r>
-            <a:r>
-              <a:rPr lang="en-AU" dirty="0" smtClean="0"/>
-              <a:t>h Stack</a:t>
+              <a:t>Embedded Bluetooth Stack</a:t>
             </a:r>
             <a:r>
               <a:rPr lang="en-AU" dirty="0"/>
@@ -6003,7 +6262,6 @@
               <a:rPr lang="en-US" dirty="0" smtClean="0"/>
               <a:t>Designed for embedded use</a:t>
             </a:r>
-            <a:endParaRPr lang="en-US" dirty="0" smtClean="0"/>
           </a:p>
           <a:p>
             <a:pPr lvl="1"/>
@@ -6025,7 +6283,6 @@
               <a:rPr lang="en-US" dirty="0" smtClean="0"/>
               <a:t>CPU Requirements</a:t>
             </a:r>
-            <a:endParaRPr lang="en-US" dirty="0" smtClean="0"/>
           </a:p>
           <a:p>
             <a:pPr lvl="1"/>
@@ -6033,7 +6290,6 @@
               <a:rPr lang="en-US" dirty="0" smtClean="0"/>
               <a:t>No RTOS requirements</a:t>
             </a:r>
-            <a:endParaRPr lang="en-US" dirty="0" smtClean="0"/>
           </a:p>
           <a:p>
             <a:pPr lvl="1"/>
@@ -6112,11 +6368,7 @@
           <a:p>
             <a:r>
               <a:rPr lang="en-AU" dirty="0" smtClean="0"/>
-              <a:t>Embedded Bluetoot</a:t>
-            </a:r>
-            <a:r>
-              <a:rPr lang="en-AU" dirty="0" smtClean="0"/>
-              <a:t>h Stack</a:t>
+              <a:t>Embedded Bluetooth Stack</a:t>
             </a:r>
             <a:r>
               <a:rPr lang="en-AU" dirty="0"/>
@@ -6179,7 +6431,7 @@
         </p:nvSpPr>
         <p:spPr>
           <a:xfrm>
-            <a:off x="539552" y="2348880"/>
+            <a:off x="467544" y="2348880"/>
             <a:ext cx="8229600" cy="1143000"/>
           </a:xfrm>
         </p:spPr>
@@ -6873,29 +7125,8 @@
                   <a:srgbClr val="000000"/>
                 </a:solidFill>
               </a:rPr>
-              <a:t>Baseband management</a:t>
-            </a:r>
-            <a:r>
-              <a:rPr lang="en-AU" sz="1800" baseline="0" dirty="0" smtClean="0">
-                <a:solidFill>
-                  <a:srgbClr val="000000"/>
-                </a:solidFill>
-              </a:rPr>
-              <a:t> </a:t>
-            </a:r>
-            <a:r>
-              <a:rPr lang="en-AU" sz="1800" baseline="0" dirty="0" smtClean="0">
-                <a:solidFill>
-                  <a:srgbClr val="000000"/>
-                </a:solidFill>
-              </a:rPr>
-              <a:t>including physical connections between devices</a:t>
-            </a:r>
-            <a:endParaRPr lang="en-AU" sz="1800" baseline="0" dirty="0" smtClean="0">
-              <a:solidFill>
-                <a:srgbClr val="000000"/>
-              </a:solidFill>
-            </a:endParaRPr>
+              <a:t>Baseband management including physical connections between devices</a:t>
+            </a:r>
           </a:p>
         </p:txBody>
       </p:sp>
@@ -7052,11 +7283,6 @@
               </a:rPr>
               <a:t>High level abstracted services</a:t>
             </a:r>
-            <a:endParaRPr lang="en-AU" sz="1800" baseline="0" dirty="0" smtClean="0">
-              <a:solidFill>
-                <a:srgbClr val="000000"/>
-              </a:solidFill>
-            </a:endParaRPr>
           </a:p>
         </p:txBody>
       </p:sp>
@@ -8521,21 +8747,46 @@
             </a:r>
           </a:p>
           <a:p>
+            <a:endParaRPr lang="en-AU" sz="1800" dirty="0" smtClean="0"/>
+          </a:p>
+          <a:p>
             <a:r>
               <a:rPr lang="en-AU" dirty="0" smtClean="0"/>
-              <a:t>Each connection can have multiple logical channels</a:t>
-            </a:r>
+              <a:t>Multiple logical channels per connection</a:t>
+            </a:r>
+          </a:p>
+          <a:p>
+            <a:endParaRPr lang="en-AU" sz="1800" dirty="0" smtClean="0"/>
           </a:p>
           <a:p>
             <a:r>
               <a:rPr lang="en-AU" dirty="0" smtClean="0"/>
-              <a:t>L2CAP layer reliability through a dedicated internal queue</a:t>
-            </a:r>
-          </a:p>
-          <a:p>
+              <a:t>L2CAP reliability </a:t>
+            </a:r>
             <a:r>
               <a:rPr lang="en-AU" dirty="0" smtClean="0"/>
-              <a:t>API for integration into user applications</a:t>
+              <a:t>through </a:t>
+            </a:r>
+            <a:r>
+              <a:rPr lang="en-AU" dirty="0" smtClean="0"/>
+              <a:t>a dedicated internal </a:t>
+            </a:r>
+            <a:r>
+              <a:rPr lang="en-AU" dirty="0" smtClean="0"/>
+              <a:t>queue</a:t>
+            </a:r>
+          </a:p>
+          <a:p>
+            <a:endParaRPr lang="en-AU" sz="1800" dirty="0" smtClean="0"/>
+          </a:p>
+          <a:p>
+            <a:r>
+              <a:rPr lang="en-AU" dirty="0" smtClean="0"/>
+              <a:t>API </a:t>
+            </a:r>
+            <a:r>
+              <a:rPr lang="en-AU" dirty="0" smtClean="0"/>
+              <a:t>for integration into user applications</a:t>
             </a:r>
           </a:p>
         </p:txBody>
@@ -8546,6 +8797,13 @@
     <a:masterClrMapping/>
   </p:clrMapOvr>
   <p:transition/>
+  <p:timing>
+    <p:tnLst>
+      <p:par>
+        <p:cTn id="1" dur="indefinite" restart="never" nodeType="tmRoot"/>
+      </p:par>
+    </p:tnLst>
+  </p:timing>
 </p:sld>
 </file>
 
@@ -8683,6 +8941,13 @@
     <a:masterClrMapping/>
   </p:clrMapOvr>
   <p:transition/>
+  <p:timing>
+    <p:tnLst>
+      <p:par>
+        <p:cTn id="1" dur="indefinite" restart="never" nodeType="tmRoot"/>
+      </p:par>
+    </p:tnLst>
+  </p:timing>
 </p:sld>
 </file>
 
@@ -8800,6 +9065,13 @@
     <a:masterClrMapping/>
   </p:clrMapOvr>
   <p:transition/>
+  <p:timing>
+    <p:tnLst>
+      <p:par>
+        <p:cTn id="1" dur="indefinite" restart="never" nodeType="tmRoot"/>
+      </p:par>
+    </p:tnLst>
+  </p:timing>
 </p:sld>
 </file>
 
@@ -8845,11 +9117,7 @@
           <a:p>
             <a:r>
               <a:rPr lang="en-AU" dirty="0" smtClean="0"/>
-              <a:t>Embedded Bluetoot</a:t>
-            </a:r>
-            <a:r>
-              <a:rPr lang="en-AU" dirty="0" smtClean="0"/>
-              <a:t>h Stack</a:t>
+              <a:t>Embedded Bluetooth Stack</a:t>
             </a:r>
             <a:r>
               <a:rPr lang="en-AU" dirty="0"/>
@@ -9030,15 +9298,7 @@
           <a:p>
             <a:r>
               <a:rPr lang="en-AU" dirty="0" smtClean="0"/>
-              <a:t>Allow for user control over Bluetooth</a:t>
-            </a:r>
-            <a:r>
-              <a:rPr lang="en-AU" dirty="0" smtClean="0"/>
-              <a:t> </a:t>
-            </a:r>
-            <a:r>
-              <a:rPr lang="en-AU" dirty="0" smtClean="0"/>
-              <a:t>connections</a:t>
+              <a:t>Allow for user control over Bluetooth connections</a:t>
             </a:r>
           </a:p>
           <a:p>
@@ -9069,11 +9329,7 @@
           <a:p>
             <a:r>
               <a:rPr lang="en-AU" dirty="0" smtClean="0"/>
-              <a:t>Embedded Bluetooth Stack </a:t>
-            </a:r>
-            <a:r>
-              <a:rPr lang="en-AU" dirty="0" smtClean="0"/>
-              <a:t>	Page </a:t>
+              <a:t>Embedded Bluetooth Stack 	Page </a:t>
             </a:r>
             <a:fld id="{16BD8E54-B886-4508-8B88-F1738B0A148F}" type="slidenum">
               <a:rPr lang="en-AU" smtClean="0"/>
@@ -9090,6 +9346,13 @@
     <a:masterClrMapping/>
   </p:clrMapOvr>
   <p:transition/>
+  <p:timing>
+    <p:tnLst>
+      <p:par>
+        <p:cTn id="1" dur="indefinite" restart="never" nodeType="tmRoot"/>
+      </p:par>
+    </p:tnLst>
+  </p:timing>
 </p:sld>
 </file>
 

</xml_diff>

<commit_message>
Minor update to the End Year Presentation.
</commit_message>
<xml_diff>
--- a/End Year Presentation.pptx
+++ b/End Year Presentation.pptx
@@ -288,7 +288,7 @@
             <a:fld id="{8BE266B8-587E-45E9-9831-C24C9CA2E489}" type="datetime4">
               <a:rPr lang="en-AU"/>
               <a:pPr/>
-              <a:t>24 November 2011</a:t>
+              <a:t>28 November 2011</a:t>
             </a:fld>
             <a:endParaRPr lang="en-AU"/>
           </a:p>
@@ -691,7 +691,7 @@
             <a:fld id="{69E0915B-5679-433C-BEEF-268271797547}" type="datetime4">
               <a:rPr lang="en-AU"/>
               <a:pPr/>
-              <a:t>24 November 2011</a:t>
+              <a:t>28 November 2011</a:t>
             </a:fld>
             <a:endParaRPr lang="en-AU"/>
           </a:p>
@@ -993,7 +993,7 @@
             <a:fld id="{23A0488A-41B5-4478-AF9E-BCFFE60AE7E4}" type="datetime4">
               <a:rPr lang="en-AU"/>
               <a:pPr/>
-              <a:t>24 November 2011</a:t>
+              <a:t>28 November 2011</a:t>
             </a:fld>
             <a:endParaRPr lang="en-AU"/>
           </a:p>
@@ -1195,7 +1195,7 @@
             <a:fld id="{BA25E77E-3A04-4012-9711-3C9CC50065B7}" type="datetime4">
               <a:rPr lang="en-AU"/>
               <a:pPr/>
-              <a:t>24 November 2011</a:t>
+              <a:t>28 November 2011</a:t>
             </a:fld>
             <a:endParaRPr lang="en-AU"/>
           </a:p>
@@ -1394,7 +1394,7 @@
             <a:fld id="{BA25E77E-3A04-4012-9711-3C9CC50065B7}" type="datetime4">
               <a:rPr lang="en-AU"/>
               <a:pPr/>
-              <a:t>24 November 2011</a:t>
+              <a:t>28 November 2011</a:t>
             </a:fld>
             <a:endParaRPr lang="en-AU"/>
           </a:p>
@@ -1593,7 +1593,7 @@
             <a:fld id="{BA25E77E-3A04-4012-9711-3C9CC50065B7}" type="datetime4">
               <a:rPr lang="en-AU"/>
               <a:pPr/>
-              <a:t>24 November 2011</a:t>
+              <a:t>28 November 2011</a:t>
             </a:fld>
             <a:endParaRPr lang="en-AU"/>
           </a:p>
@@ -1822,7 +1822,7 @@
             <a:fld id="{69E0915B-5679-433C-BEEF-268271797547}" type="datetime4">
               <a:rPr lang="en-AU" smtClean="0"/>
               <a:pPr/>
-              <a:t>24 November 2011</a:t>
+              <a:t>28 November 2011</a:t>
             </a:fld>
             <a:endParaRPr lang="en-AU"/>
           </a:p>
@@ -1944,7 +1944,7 @@
             <a:fld id="{FE43F505-3EA0-4E95-B7C8-9CE4A21DD553}" type="datetime4">
               <a:rPr lang="en-AU"/>
               <a:pPr/>
-              <a:t>24 November 2011</a:t>
+              <a:t>28 November 2011</a:t>
             </a:fld>
             <a:endParaRPr lang="en-AU"/>
           </a:p>
@@ -4933,13 +4933,8 @@
             </a:br>
             <a:r>
               <a:rPr lang="en-AU" sz="2000" b="1" baseline="0" dirty="0" smtClean="0"/>
-              <a:t>Dean </a:t>
-            </a:r>
-            <a:r>
-              <a:rPr lang="en-AU" sz="2000" b="1" baseline="0" dirty="0" smtClean="0"/>
-              <a:t>Camera</a:t>
-            </a:r>
-            <a:endParaRPr lang="en-AU" sz="2000" b="1" baseline="0" dirty="0" smtClean="0"/>
+              <a:t>Dean Camera</a:t>
+            </a:r>
           </a:p>
           <a:p>
             <a:endParaRPr lang="en-AU" sz="2000" b="1" baseline="0" dirty="0" smtClean="0"/>
@@ -5536,7 +5531,7 @@
             <a:pPr lvl="1"/>
             <a:r>
               <a:rPr lang="en-AU" dirty="0" smtClean="0"/>
-              <a:t>Mobile Phone</a:t>
+              <a:t>Sony Ericson z550i Mobile Phone</a:t>
             </a:r>
           </a:p>
           <a:p>
@@ -5869,7 +5864,6 @@
               <a:rPr lang="en-AU" dirty="0" smtClean="0"/>
               <a:t>All project materials (source code, thesis, presentations, photos) uploaded online</a:t>
             </a:r>
-            <a:endParaRPr lang="en-AU" dirty="0" smtClean="0"/>
           </a:p>
           <a:p>
             <a:endParaRPr lang="en-AU" sz="1400" dirty="0" smtClean="0"/>
@@ -8761,32 +8755,16 @@
           <a:p>
             <a:r>
               <a:rPr lang="en-AU" dirty="0" smtClean="0"/>
-              <a:t>L2CAP reliability </a:t>
-            </a:r>
+              <a:t>L2CAP reliability through a dedicated internal queue</a:t>
+            </a:r>
+          </a:p>
+          <a:p>
+            <a:endParaRPr lang="en-AU" sz="1800" dirty="0" smtClean="0"/>
+          </a:p>
+          <a:p>
             <a:r>
               <a:rPr lang="en-AU" dirty="0" smtClean="0"/>
-              <a:t>through </a:t>
-            </a:r>
-            <a:r>
-              <a:rPr lang="en-AU" dirty="0" smtClean="0"/>
-              <a:t>a dedicated internal </a:t>
-            </a:r>
-            <a:r>
-              <a:rPr lang="en-AU" dirty="0" smtClean="0"/>
-              <a:t>queue</a:t>
-            </a:r>
-          </a:p>
-          <a:p>
-            <a:endParaRPr lang="en-AU" sz="1800" dirty="0" smtClean="0"/>
-          </a:p>
-          <a:p>
-            <a:r>
-              <a:rPr lang="en-AU" dirty="0" smtClean="0"/>
-              <a:t>API </a:t>
-            </a:r>
-            <a:r>
-              <a:rPr lang="en-AU" dirty="0" smtClean="0"/>
-              <a:t>for integration into user applications</a:t>
+              <a:t>API for integration into user applications</a:t>
             </a:r>
           </a:p>
         </p:txBody>
@@ -8892,8 +8870,9 @@
           <a:p>
             <a:r>
               <a:rPr lang="en-AU" dirty="0" smtClean="0"/>
-              <a:t>RFCOMM</a:t>
-            </a:r>
+              <a:t>RF Communication (RFCOMM)</a:t>
+            </a:r>
+            <a:endParaRPr lang="en-AU" dirty="0" smtClean="0"/>
           </a:p>
           <a:p>
             <a:pPr lvl="1"/>
@@ -8916,8 +8895,9 @@
           <a:p>
             <a:r>
               <a:rPr lang="en-AU" dirty="0" smtClean="0"/>
-              <a:t>HID</a:t>
-            </a:r>
+              <a:t>Human Interface Device (HID)</a:t>
+            </a:r>
+            <a:endParaRPr lang="en-AU" dirty="0" smtClean="0"/>
           </a:p>
           <a:p>
             <a:pPr lvl="1"/>
@@ -9036,8 +9016,9 @@
           <a:p>
             <a:r>
               <a:rPr lang="en-AU" dirty="0" smtClean="0"/>
-              <a:t>SDP</a:t>
-            </a:r>
+              <a:t>Service Discovery Protocol (SDP)</a:t>
+            </a:r>
+            <a:endParaRPr lang="en-AU" dirty="0" smtClean="0"/>
           </a:p>
           <a:p>
             <a:pPr lvl="1"/>

</xml_diff>